<commit_message>
update powerpoint for milestone2
</commit_message>
<xml_diff>
--- a/CS315 P2 Production.pptx
+++ b/CS315 P2 Production.pptx
@@ -383,7 +383,7 @@
           <a:p>
             <a:fld id="{052CEAA0-CEA8-4860-9757-7A11AC3F23CB}" type="datetimeFigureOut">
               <a:rPr lang="en-US" smtClean="0"/>
-              <a:t>10/23/24</a:t>
+              <a:t>10/30/24</a:t>
             </a:fld>
             <a:endParaRPr lang="en-US"/>
           </a:p>
@@ -553,7 +553,7 @@
           <a:p>
             <a:fld id="{052CEAA0-CEA8-4860-9757-7A11AC3F23CB}" type="datetimeFigureOut">
               <a:rPr lang="en-US" smtClean="0"/>
-              <a:t>10/23/24</a:t>
+              <a:t>10/30/24</a:t>
             </a:fld>
             <a:endParaRPr lang="en-US"/>
           </a:p>
@@ -733,7 +733,7 @@
           <a:p>
             <a:fld id="{052CEAA0-CEA8-4860-9757-7A11AC3F23CB}" type="datetimeFigureOut">
               <a:rPr lang="en-US" smtClean="0"/>
-              <a:t>10/23/24</a:t>
+              <a:t>10/30/24</a:t>
             </a:fld>
             <a:endParaRPr lang="en-US"/>
           </a:p>
@@ -903,7 +903,7 @@
           <a:p>
             <a:fld id="{052CEAA0-CEA8-4860-9757-7A11AC3F23CB}" type="datetimeFigureOut">
               <a:rPr lang="en-US" smtClean="0"/>
-              <a:t>10/23/24</a:t>
+              <a:t>10/30/24</a:t>
             </a:fld>
             <a:endParaRPr lang="en-US"/>
           </a:p>
@@ -1149,7 +1149,7 @@
           <a:p>
             <a:fld id="{052CEAA0-CEA8-4860-9757-7A11AC3F23CB}" type="datetimeFigureOut">
               <a:rPr lang="en-US" smtClean="0"/>
-              <a:t>10/23/24</a:t>
+              <a:t>10/30/24</a:t>
             </a:fld>
             <a:endParaRPr lang="en-US"/>
           </a:p>
@@ -1381,7 +1381,7 @@
           <a:p>
             <a:fld id="{052CEAA0-CEA8-4860-9757-7A11AC3F23CB}" type="datetimeFigureOut">
               <a:rPr lang="en-US" smtClean="0"/>
-              <a:t>10/23/24</a:t>
+              <a:t>10/30/24</a:t>
             </a:fld>
             <a:endParaRPr lang="en-US"/>
           </a:p>
@@ -1748,7 +1748,7 @@
           <a:p>
             <a:fld id="{052CEAA0-CEA8-4860-9757-7A11AC3F23CB}" type="datetimeFigureOut">
               <a:rPr lang="en-US" smtClean="0"/>
-              <a:t>10/23/24</a:t>
+              <a:t>10/30/24</a:t>
             </a:fld>
             <a:endParaRPr lang="en-US"/>
           </a:p>
@@ -1866,7 +1866,7 @@
           <a:p>
             <a:fld id="{052CEAA0-CEA8-4860-9757-7A11AC3F23CB}" type="datetimeFigureOut">
               <a:rPr lang="en-US" smtClean="0"/>
-              <a:t>10/23/24</a:t>
+              <a:t>10/30/24</a:t>
             </a:fld>
             <a:endParaRPr lang="en-US"/>
           </a:p>
@@ -1961,7 +1961,7 @@
           <a:p>
             <a:fld id="{052CEAA0-CEA8-4860-9757-7A11AC3F23CB}" type="datetimeFigureOut">
               <a:rPr lang="en-US" smtClean="0"/>
-              <a:t>10/23/24</a:t>
+              <a:t>10/30/24</a:t>
             </a:fld>
             <a:endParaRPr lang="en-US"/>
           </a:p>
@@ -2238,7 +2238,7 @@
           <a:p>
             <a:fld id="{052CEAA0-CEA8-4860-9757-7A11AC3F23CB}" type="datetimeFigureOut">
               <a:rPr lang="en-US" smtClean="0"/>
-              <a:t>10/23/24</a:t>
+              <a:t>10/30/24</a:t>
             </a:fld>
             <a:endParaRPr lang="en-US"/>
           </a:p>
@@ -2495,7 +2495,7 @@
           <a:p>
             <a:fld id="{052CEAA0-CEA8-4860-9757-7A11AC3F23CB}" type="datetimeFigureOut">
               <a:rPr lang="en-US" smtClean="0"/>
-              <a:t>10/23/24</a:t>
+              <a:t>10/30/24</a:t>
             </a:fld>
             <a:endParaRPr lang="en-US"/>
           </a:p>
@@ -2708,7 +2708,7 @@
           <a:p>
             <a:fld id="{052CEAA0-CEA8-4860-9757-7A11AC3F23CB}" type="datetimeFigureOut">
               <a:rPr lang="en-US" smtClean="0"/>
-              <a:t>10/23/24</a:t>
+              <a:t>10/30/24</a:t>
             </a:fld>
             <a:endParaRPr lang="en-US"/>
           </a:p>
@@ -3266,9 +3266,16 @@
             <p:ph idx="1"/>
           </p:nvPr>
         </p:nvSpPr>
-        <p:spPr/>
-        <p:txBody>
-          <a:bodyPr/>
+        <p:spPr>
+          <a:xfrm>
+            <a:off x="838200" y="1825625"/>
+            <a:ext cx="10515600" cy="2416766"/>
+          </a:xfrm>
+        </p:spPr>
+        <p:txBody>
+          <a:bodyPr>
+            <a:normAutofit/>
+          </a:bodyPr>
           <a:lstStyle/>
           <a:p>
             <a:r>
@@ -3399,12 +3406,70 @@
         </p:nvSpPr>
         <p:spPr/>
         <p:txBody>
-          <a:bodyPr/>
-          <a:lstStyle/>
-          <a:p>
+          <a:bodyPr>
+            <a:normAutofit fontScale="55000" lnSpcReduction="20000"/>
+          </a:bodyPr>
+          <a:lstStyle/>
+          <a:p>
+            <a:pPr marL="0" indent="0">
+              <a:buNone/>
+            </a:pPr>
             <a:r>
               <a:rPr lang="en-US" dirty="0"/>
-              <a:t>Delete and add your own reflection ( What are you struggling with? What is making more sense to you? What is the role of code in producing engaging game aesthetics?)</a:t>
+              <a:t>The main thing I’m struggling with is time, honestly. I’ve been able to figure out everything that I need/want to add to my game, it just takes time. If I had to choose something that I’m struggling with (haven’t figured out yet), it would be the UI. I want to add a UI with lives and a timer, similar to Mario, but I don’t yet know how to make it so the UI stays in the same corner of the screen no matter what. I think it may have something to do with a </a:t>
+            </a:r>
+            <a:r>
+              <a:rPr lang="en-US" dirty="0" err="1"/>
+              <a:t>CanvasLayer</a:t>
+            </a:r>
+            <a:r>
+              <a:rPr lang="en-US" dirty="0"/>
+              <a:t> node, but I’m not sure. </a:t>
+            </a:r>
+          </a:p>
+          <a:p>
+            <a:pPr marL="0" indent="0">
+              <a:buNone/>
+            </a:pPr>
+            <a:endParaRPr lang="en-US" dirty="0"/>
+          </a:p>
+          <a:p>
+            <a:pPr marL="0" indent="0">
+              <a:buNone/>
+            </a:pPr>
+            <a:r>
+              <a:rPr lang="en-US" dirty="0"/>
+              <a:t>In terms of what’s making sense to me, I’m really enjoying understanding the relationship between the game’s objects and the code that’s associated with them. I feel confident now in my abilities to connect signals from one side of the game to another. I can easily make things happen in the background without the player noticing. I have a much better understanding of Godot in general now than I did during project 1. I think that starting from nothing, rather than a “template” helps me with that understanding.</a:t>
+            </a:r>
+          </a:p>
+          <a:p>
+            <a:pPr marL="0" indent="0">
+              <a:buNone/>
+            </a:pPr>
+            <a:endParaRPr lang="en-US" dirty="0"/>
+          </a:p>
+          <a:p>
+            <a:pPr marL="0" indent="0">
+              <a:buNone/>
+            </a:pPr>
+            <a:r>
+              <a:rPr lang="en-US" dirty="0"/>
+              <a:t>Code has played a large role in producing game aesthetics. One example of this is the code I use to make messages pop up. Throughout Level 1, there are a bunch of sign-posts. When the player stands close enough to them, a message pops up, explaining a new mechanic to the player. The coding has always been what I’m most confident with, so it feels really good to put my skills to use in this environment.</a:t>
+            </a:r>
+          </a:p>
+          <a:p>
+            <a:pPr marL="0" indent="0">
+              <a:buNone/>
+            </a:pPr>
+            <a:endParaRPr lang="en-US" dirty="0"/>
+          </a:p>
+          <a:p>
+            <a:pPr marL="0" indent="0">
+              <a:buNone/>
+            </a:pPr>
+            <a:r>
+              <a:rPr lang="en-US" dirty="0"/>
+              <a:t>Overall, I’m happy with how my game is coming along. I still need to add a second level, as well as sound effects and a menu, but I don’t expect those to take me too long. I think if I were to keep working on this game for a month after I submit it, it could turn into something really cool. Nothing exactly innovative, but cool nonetheless. </a:t>
             </a:r>
           </a:p>
           <a:p>
@@ -4356,34 +4421,42 @@
           </a:p>
         </p:txBody>
       </p:sp>
-      <p:sp>
-        <p:nvSpPr>
-          <p:cNvPr id="3" name="Content Placeholder 2">
+      <p:pic>
+        <p:nvPicPr>
+          <p:cNvPr id="5" name="Picture 4" descr="A screenshot of a video game&#10;&#10;Description automatically generated">
             <a:extLst>
               <a:ext uri="{FF2B5EF4-FFF2-40B4-BE49-F238E27FC236}">
-                <a16:creationId xmlns:a16="http://schemas.microsoft.com/office/drawing/2014/main" id="{9CAE7D8B-8C08-4E66-DB2C-0EF8F1D7CAE3}"/>
+                <a16:creationId xmlns:a16="http://schemas.microsoft.com/office/drawing/2014/main" id="{61259948-8458-2042-7165-08D94EF6CC46}"/>
               </a:ext>
             </a:extLst>
           </p:cNvPr>
-          <p:cNvSpPr>
-            <a:spLocks noGrp="1"/>
-          </p:cNvSpPr>
-          <p:nvPr>
-            <p:ph idx="1"/>
-          </p:nvPr>
-        </p:nvSpPr>
-        <p:spPr/>
-        <p:txBody>
-          <a:bodyPr/>
-          <a:lstStyle/>
-          <a:p>
-            <a:r>
-              <a:rPr lang="en-US" dirty="0"/>
-              <a:t>Add a screenshot(s) of your project</a:t>
-            </a:r>
-          </a:p>
-        </p:txBody>
-      </p:sp>
+          <p:cNvPicPr>
+            <a:picLocks noChangeAspect="1"/>
+          </p:cNvPicPr>
+          <p:nvPr/>
+        </p:nvPicPr>
+        <p:blipFill>
+          <a:blip r:embed="rId2">
+            <a:extLst>
+              <a:ext uri="{28A0092B-C50C-407E-A947-70E740481C1C}">
+                <a14:useLocalDpi xmlns:a14="http://schemas.microsoft.com/office/drawing/2010/main" val="0"/>
+              </a:ext>
+            </a:extLst>
+          </a:blip>
+          <a:stretch>
+            <a:fillRect/>
+          </a:stretch>
+        </p:blipFill>
+        <p:spPr>
+          <a:xfrm>
+            <a:off x="1211580" y="1381250"/>
+            <a:ext cx="9768840" cy="4879316"/>
+          </a:xfrm>
+          <a:prstGeom prst="rect">
+            <a:avLst/>
+          </a:prstGeom>
+        </p:spPr>
+      </p:pic>
     </p:spTree>
     <p:extLst>
       <p:ext uri="{BB962C8B-B14F-4D97-AF65-F5344CB8AC3E}">
@@ -4475,8 +4548,51 @@
           <a:p>
             <a:r>
               <a:rPr lang="en-US" dirty="0"/>
-              <a:t>Add an open question you have about your project</a:t>
-            </a:r>
+              <a:t>How much guidance should the player be given?</a:t>
+            </a:r>
+          </a:p>
+          <a:p>
+            <a:r>
+              <a:rPr lang="en-US" dirty="0"/>
+              <a:t>How can I use color to more effectively distinguish between </a:t>
+            </a:r>
+            <a:r>
+              <a:rPr lang="en-US"/>
+              <a:t>game elements?</a:t>
+            </a:r>
+            <a:endParaRPr lang="en-US" dirty="0"/>
+          </a:p>
+        </p:txBody>
+      </p:sp>
+      <p:sp>
+        <p:nvSpPr>
+          <p:cNvPr id="4" name="TextBox 3">
+            <a:extLst>
+              <a:ext uri="{FF2B5EF4-FFF2-40B4-BE49-F238E27FC236}">
+                <a16:creationId xmlns:a16="http://schemas.microsoft.com/office/drawing/2014/main" id="{2F951A2E-4456-27C3-0038-10BEB5F24055}"/>
+              </a:ext>
+            </a:extLst>
+          </p:cNvPr>
+          <p:cNvSpPr txBox="1"/>
+          <p:nvPr/>
+        </p:nvSpPr>
+        <p:spPr>
+          <a:xfrm>
+            <a:off x="8346558" y="2083981"/>
+            <a:ext cx="184731" cy="369332"/>
+          </a:xfrm>
+          <a:prstGeom prst="rect">
+            <a:avLst/>
+          </a:prstGeom>
+          <a:noFill/>
+        </p:spPr>
+        <p:txBody>
+          <a:bodyPr wrap="none" rtlCol="0">
+            <a:spAutoFit/>
+          </a:bodyPr>
+          <a:lstStyle/>
+          <a:p>
+            <a:endParaRPr lang="en-US" dirty="0"/>
           </a:p>
         </p:txBody>
       </p:sp>

</xml_diff>